<commit_message>
fixed incorrect diagram relationship
</commit_message>
<xml_diff>
--- a/docs/fsdf-ont-images.pptx
+++ b/docs/fsdf-ont-images.pptx
@@ -119,6 +119,10 @@
 </p:presentation>
 </file>
 
+<file path=ppt/revisionInfo.xml><?xml version="1.0" encoding="utf-8"?>
+<p1510:revInfo xmlns:a="http://schemas.openxmlformats.org/drawingml/2006/main" xmlns:r="http://schemas.openxmlformats.org/officeDocument/2006/relationships" xmlns:p1510="http://schemas.microsoft.com/office/powerpoint/2015/10/main"/>
+</file>
+
 <file path=ppt/slideLayouts/slideLayout1.xml><?xml version="1.0" encoding="utf-8"?>
 <p:sldLayout xmlns:a="http://schemas.openxmlformats.org/drawingml/2006/main" xmlns:r="http://schemas.openxmlformats.org/officeDocument/2006/relationships" xmlns:p="http://schemas.openxmlformats.org/presentationml/2006/main" type="title" preserve="1">
   <p:cSld name="Title Slide">
@@ -268,7 +272,7 @@
           <a:p>
             <a:fld id="{8C85DE42-2BBB-4BEC-98E8-2E54C2B244F5}" type="datetimeFigureOut">
               <a:rPr lang="en-AU" smtClean="0"/>
-              <a:t>28/6/18</a:t>
+              <a:t>19/07/2018</a:t>
             </a:fld>
             <a:endParaRPr lang="en-AU"/>
           </a:p>
@@ -468,7 +472,7 @@
           <a:p>
             <a:fld id="{8C85DE42-2BBB-4BEC-98E8-2E54C2B244F5}" type="datetimeFigureOut">
               <a:rPr lang="en-AU" smtClean="0"/>
-              <a:t>28/6/18</a:t>
+              <a:t>19/07/2018</a:t>
             </a:fld>
             <a:endParaRPr lang="en-AU"/>
           </a:p>
@@ -678,7 +682,7 @@
           <a:p>
             <a:fld id="{8C85DE42-2BBB-4BEC-98E8-2E54C2B244F5}" type="datetimeFigureOut">
               <a:rPr lang="en-AU" smtClean="0"/>
-              <a:t>28/6/18</a:t>
+              <a:t>19/07/2018</a:t>
             </a:fld>
             <a:endParaRPr lang="en-AU"/>
           </a:p>
@@ -878,7 +882,7 @@
           <a:p>
             <a:fld id="{8C85DE42-2BBB-4BEC-98E8-2E54C2B244F5}" type="datetimeFigureOut">
               <a:rPr lang="en-AU" smtClean="0"/>
-              <a:t>28/6/18</a:t>
+              <a:t>19/07/2018</a:t>
             </a:fld>
             <a:endParaRPr lang="en-AU"/>
           </a:p>
@@ -1154,7 +1158,7 @@
           <a:p>
             <a:fld id="{8C85DE42-2BBB-4BEC-98E8-2E54C2B244F5}" type="datetimeFigureOut">
               <a:rPr lang="en-AU" smtClean="0"/>
-              <a:t>28/6/18</a:t>
+              <a:t>19/07/2018</a:t>
             </a:fld>
             <a:endParaRPr lang="en-AU"/>
           </a:p>
@@ -1422,7 +1426,7 @@
           <a:p>
             <a:fld id="{8C85DE42-2BBB-4BEC-98E8-2E54C2B244F5}" type="datetimeFigureOut">
               <a:rPr lang="en-AU" smtClean="0"/>
-              <a:t>28/6/18</a:t>
+              <a:t>19/07/2018</a:t>
             </a:fld>
             <a:endParaRPr lang="en-AU"/>
           </a:p>
@@ -1837,7 +1841,7 @@
           <a:p>
             <a:fld id="{8C85DE42-2BBB-4BEC-98E8-2E54C2B244F5}" type="datetimeFigureOut">
               <a:rPr lang="en-AU" smtClean="0"/>
-              <a:t>28/6/18</a:t>
+              <a:t>19/07/2018</a:t>
             </a:fld>
             <a:endParaRPr lang="en-AU"/>
           </a:p>
@@ -1979,7 +1983,7 @@
           <a:p>
             <a:fld id="{8C85DE42-2BBB-4BEC-98E8-2E54C2B244F5}" type="datetimeFigureOut">
               <a:rPr lang="en-AU" smtClean="0"/>
-              <a:t>28/6/18</a:t>
+              <a:t>19/07/2018</a:t>
             </a:fld>
             <a:endParaRPr lang="en-AU"/>
           </a:p>
@@ -2092,7 +2096,7 @@
           <a:p>
             <a:fld id="{8C85DE42-2BBB-4BEC-98E8-2E54C2B244F5}" type="datetimeFigureOut">
               <a:rPr lang="en-AU" smtClean="0"/>
-              <a:t>28/6/18</a:t>
+              <a:t>19/07/2018</a:t>
             </a:fld>
             <a:endParaRPr lang="en-AU"/>
           </a:p>
@@ -2405,7 +2409,7 @@
           <a:p>
             <a:fld id="{8C85DE42-2BBB-4BEC-98E8-2E54C2B244F5}" type="datetimeFigureOut">
               <a:rPr lang="en-AU" smtClean="0"/>
-              <a:t>28/6/18</a:t>
+              <a:t>19/07/2018</a:t>
             </a:fld>
             <a:endParaRPr lang="en-AU"/>
           </a:p>
@@ -2694,7 +2698,7 @@
           <a:p>
             <a:fld id="{8C85DE42-2BBB-4BEC-98E8-2E54C2B244F5}" type="datetimeFigureOut">
               <a:rPr lang="en-AU" smtClean="0"/>
-              <a:t>28/6/18</a:t>
+              <a:t>19/07/2018</a:t>
             </a:fld>
             <a:endParaRPr lang="en-AU"/>
           </a:p>
@@ -2937,7 +2941,7 @@
           <a:p>
             <a:fld id="{8C85DE42-2BBB-4BEC-98E8-2E54C2B244F5}" type="datetimeFigureOut">
               <a:rPr lang="en-AU" smtClean="0"/>
-              <a:t>28/6/18</a:t>
+              <a:t>19/07/2018</a:t>
             </a:fld>
             <a:endParaRPr lang="en-AU"/>
           </a:p>
@@ -18985,8 +18989,8 @@
         </p:nvSpPr>
         <p:spPr>
           <a:xfrm>
-            <a:off x="6425628" y="4349867"/>
-            <a:ext cx="1167564" cy="215444"/>
+            <a:off x="6192365" y="4349867"/>
+            <a:ext cx="1419235" cy="215444"/>
           </a:xfrm>
           <a:prstGeom prst="rect">
             <a:avLst/>
@@ -19003,7 +19007,7 @@
           <a:p>
             <a:r>
               <a:rPr lang="en-AU" sz="1400" dirty="0" err="1"/>
-              <a:t>gnaf:MeshBlock</a:t>
+              <a:t>gnaf:hasMeshBlock</a:t>
             </a:r>
             <a:endParaRPr lang="en-AU" sz="1400" dirty="0"/>
           </a:p>
@@ -19403,7 +19407,7 @@
             <a:solidFill>
               <a:schemeClr val="tx1"/>
             </a:solidFill>
-            <a:headEnd type="none" w="med" len="med"/>
+            <a:headEnd type="arrow" w="med" len="med"/>
             <a:tailEnd type="arrow" w="med" len="med"/>
           </a:ln>
         </p:spPr>
@@ -19485,8 +19489,8 @@
         </p:nvSpPr>
         <p:spPr>
           <a:xfrm>
-            <a:off x="8722216" y="3243514"/>
-            <a:ext cx="1030860" cy="215444"/>
+            <a:off x="8750209" y="3224852"/>
+            <a:ext cx="933012" cy="215444"/>
           </a:xfrm>
           <a:prstGeom prst="rect">
             <a:avLst/>
@@ -19503,7 +19507,7 @@
           <a:p>
             <a:r>
               <a:rPr lang="en-AU" sz="1400" dirty="0" err="1"/>
-              <a:t>geo:sfTouches</a:t>
+              <a:t>geo:sfWithin</a:t>
             </a:r>
             <a:endParaRPr lang="en-AU" sz="1400" dirty="0"/>
           </a:p>
@@ -19523,8 +19527,8 @@
         </p:nvSpPr>
         <p:spPr>
           <a:xfrm>
-            <a:off x="9022976" y="5745278"/>
-            <a:ext cx="829714" cy="215444"/>
+            <a:off x="9022976" y="5707954"/>
+            <a:ext cx="1030860" cy="215444"/>
           </a:xfrm>
           <a:prstGeom prst="rect">
             <a:avLst/>
@@ -19541,7 +19545,7 @@
           <a:p>
             <a:r>
               <a:rPr lang="en-AU" sz="1400" dirty="0" err="1"/>
-              <a:t>dct:hasPart</a:t>
+              <a:t>geo:sfTouches</a:t>
             </a:r>
             <a:endParaRPr lang="en-AU" sz="1400" dirty="0"/>
           </a:p>
@@ -20274,143 +20278,6 @@
       </p:sp>
       <p:sp>
         <p:nvSpPr>
-          <p:cNvPr id="48" name="Rectangle 47">
-            <a:extLst>
-              <a:ext uri="{FF2B5EF4-FFF2-40B4-BE49-F238E27FC236}">
-                <a16:creationId xmlns:a16="http://schemas.microsoft.com/office/drawing/2014/main" id="{BEE7CE46-3DC2-864D-AFFA-A4EAC424DC5E}"/>
-              </a:ext>
-            </a:extLst>
-          </p:cNvPr>
-          <p:cNvSpPr/>
-          <p:nvPr/>
-        </p:nvSpPr>
-        <p:spPr>
-          <a:xfrm>
-            <a:off x="9703305" y="4314558"/>
-            <a:ext cx="1330778" cy="595993"/>
-          </a:xfrm>
-          <a:prstGeom prst="rect">
-            <a:avLst/>
-          </a:prstGeom>
-          <a:solidFill>
-            <a:schemeClr val="bg1"/>
-          </a:solidFill>
-          <a:ln>
-            <a:solidFill>
-              <a:schemeClr val="tx1"/>
-            </a:solidFill>
-          </a:ln>
-        </p:spPr>
-        <p:style>
-          <a:lnRef idx="2">
-            <a:schemeClr val="accent1">
-              <a:shade val="50000"/>
-            </a:schemeClr>
-          </a:lnRef>
-          <a:fillRef idx="1">
-            <a:schemeClr val="accent1"/>
-          </a:fillRef>
-          <a:effectRef idx="0">
-            <a:schemeClr val="accent1"/>
-          </a:effectRef>
-          <a:fontRef idx="minor">
-            <a:schemeClr val="lt1"/>
-          </a:fontRef>
-        </p:style>
-        <p:txBody>
-          <a:bodyPr rtlCol="0" anchor="ctr"/>
-          <a:lstStyle/>
-          <a:p>
-            <a:pPr algn="ctr"/>
-            <a:r>
-              <a:rPr lang="en-US" sz="1400" dirty="0">
-                <a:solidFill>
-                  <a:schemeClr val="tx1"/>
-                </a:solidFill>
-              </a:rPr>
-              <a:t>ahgf:</a:t>
-            </a:r>
-            <a:br>
-              <a:rPr lang="en-US" sz="1400" dirty="0">
-                <a:solidFill>
-                  <a:schemeClr val="tx1"/>
-                </a:solidFill>
-              </a:rPr>
-            </a:br>
-            <a:r>
-              <a:rPr lang="en-US" sz="1400" dirty="0">
-                <a:solidFill>
-                  <a:schemeClr val="tx1"/>
-                </a:solidFill>
-              </a:rPr>
-              <a:t>Drainage</a:t>
-            </a:r>
-            <a:br>
-              <a:rPr lang="en-US" sz="1400" dirty="0">
-                <a:solidFill>
-                  <a:schemeClr val="tx1"/>
-                </a:solidFill>
-              </a:rPr>
-            </a:br>
-            <a:r>
-              <a:rPr lang="en-US" sz="1400" dirty="0">
-                <a:solidFill>
-                  <a:schemeClr val="tx1"/>
-                </a:solidFill>
-              </a:rPr>
-              <a:t>Division</a:t>
-            </a:r>
-          </a:p>
-        </p:txBody>
-      </p:sp>
-      <p:cxnSp>
-        <p:nvCxnSpPr>
-          <p:cNvPr id="49" name="Straight Arrow Connector 48">
-            <a:extLst>
-              <a:ext uri="{FF2B5EF4-FFF2-40B4-BE49-F238E27FC236}">
-                <a16:creationId xmlns:a16="http://schemas.microsoft.com/office/drawing/2014/main" id="{7A441DE8-1673-B549-8E1F-C09E1F01ACAE}"/>
-              </a:ext>
-            </a:extLst>
-          </p:cNvPr>
-          <p:cNvCxnSpPr>
-            <a:cxnSpLocks/>
-          </p:cNvCxnSpPr>
-          <p:nvPr/>
-        </p:nvCxnSpPr>
-        <p:spPr>
-          <a:xfrm flipV="1">
-            <a:off x="10111704" y="2096789"/>
-            <a:ext cx="0" cy="2211980"/>
-          </a:xfrm>
-          <a:prstGeom prst="straightConnector1">
-            <a:avLst/>
-          </a:prstGeom>
-          <a:ln>
-            <a:solidFill>
-              <a:schemeClr val="tx1"/>
-            </a:solidFill>
-            <a:prstDash val="solid"/>
-            <a:headEnd type="arrow" w="med" len="med"/>
-            <a:tailEnd type="none" w="med" len="med"/>
-          </a:ln>
-        </p:spPr>
-        <p:style>
-          <a:lnRef idx="1">
-            <a:schemeClr val="accent1"/>
-          </a:lnRef>
-          <a:fillRef idx="0">
-            <a:schemeClr val="accent1"/>
-          </a:fillRef>
-          <a:effectRef idx="0">
-            <a:schemeClr val="accent1"/>
-          </a:effectRef>
-          <a:fontRef idx="minor">
-            <a:schemeClr val="tx1"/>
-          </a:fontRef>
-        </p:style>
-      </p:cxnSp>
-      <p:sp>
-        <p:nvSpPr>
           <p:cNvPr id="62" name="Rectangle 61">
             <a:extLst>
               <a:ext uri="{FF2B5EF4-FFF2-40B4-BE49-F238E27FC236}">
@@ -20585,18 +20452,19 @@
           <p:cNvCxnSpPr>
             <a:cxnSpLocks/>
             <a:stCxn id="46" idx="2"/>
-            <a:endCxn id="48" idx="2"/>
+            <a:endCxn id="59" idx="3"/>
           </p:cNvCxnSpPr>
           <p:nvPr/>
         </p:nvCxnSpPr>
         <p:spPr>
-          <a:xfrm rot="16200000" flipH="1">
-            <a:off x="7143938" y="1685795"/>
-            <a:ext cx="5968" cy="6443544"/>
-          </a:xfrm>
-          <a:prstGeom prst="bentConnector3">
+          <a:xfrm rot="5400000" flipH="1" flipV="1">
+            <a:off x="6495077" y="365577"/>
+            <a:ext cx="1969078" cy="7108933"/>
+          </a:xfrm>
+          <a:prstGeom prst="bentConnector4">
             <a:avLst>
-              <a:gd name="adj1" fmla="val 30832523"/>
+              <a:gd name="adj1" fmla="val -92639"/>
+              <a:gd name="adj2" fmla="val 103216"/>
             </a:avLst>
           </a:prstGeom>
           <a:ln>

</xml_diff>